<commit_message>
The Artikel 42 Algorithm
</commit_message>
<xml_diff>
--- a/Presentations/Presentatie week 1.pptx
+++ b/Presentations/Presentatie week 1.pptx
@@ -5,7 +5,7 @@
     <p:sldMasterId id="2147483816" r:id="rId1"/>
   </p:sldMasterIdLst>
   <p:notesMasterIdLst>
-    <p:notesMasterId r:id="rId10"/>
+    <p:notesMasterId r:id="rId11"/>
   </p:notesMasterIdLst>
   <p:sldIdLst>
     <p:sldId id="256" r:id="rId2"/>
@@ -16,6 +16,7 @@
     <p:sldId id="262" r:id="rId7"/>
     <p:sldId id="263" r:id="rId8"/>
     <p:sldId id="264" r:id="rId9"/>
+    <p:sldId id="265" r:id="rId10"/>
   </p:sldIdLst>
   <p:sldSz cx="9144000" cy="6858000" type="screen4x3"/>
   <p:notesSz cx="6858000" cy="9144000"/>
@@ -7450,27 +7451,17 @@
             </a:r>
             <a:r>
               <a:rPr lang="nl-NL" dirty="0" smtClean="0"/>
-              <a:t>) voor de 	getallen 1, 2, 5 en </a:t>
-            </a:r>
+              <a:t>) voor de 	getallen 1, 2, 5 en 24</a:t>
+            </a:r>
+          </a:p>
+          <a:p>
+            <a:endParaRPr lang="nl-NL" dirty="0"/>
+          </a:p>
+          <a:p>
             <a:r>
               <a:rPr lang="nl-NL" dirty="0" smtClean="0"/>
-              <a:t>24</a:t>
-            </a:r>
-            <a:endParaRPr lang="nl-NL" dirty="0" smtClean="0"/>
-          </a:p>
-          <a:p>
-            <a:endParaRPr lang="nl-NL" dirty="0"/>
-          </a:p>
-          <a:p>
-            <a:r>
-              <a:rPr lang="nl-NL" dirty="0" smtClean="0"/>
-              <a:t>Doe dit vervolgens ook voor 6, 10, 26 en </a:t>
-            </a:r>
-            <a:r>
-              <a:rPr lang="nl-NL" dirty="0" smtClean="0"/>
-              <a:t>30</a:t>
-            </a:r>
-            <a:endParaRPr lang="nl-NL" dirty="0" smtClean="0"/>
+              <a:t>Doe dit vervolgens ook voor 6, 10, 26 en 30</a:t>
+            </a:r>
           </a:p>
           <a:p>
             <a:endParaRPr lang="nl-NL" dirty="0"/>
@@ -10419,7 +10410,35 @@
                 <a:latin typeface="Times New Roman" panose="02020603050405020304" pitchFamily="18" charset="0"/>
                 <a:cs typeface="Times New Roman" panose="02020603050405020304" pitchFamily="18" charset="0"/>
               </a:rPr>
-              <a:t>Voor uitkomst 6 al 14 operaties nodig. Dus een uitkomstruimte </a:t>
+              <a:t>Voor uitkomst </a:t>
+            </a:r>
+            <a:r>
+              <a:rPr lang="nl-NL" dirty="0" smtClean="0">
+                <a:latin typeface="Times New Roman" panose="02020603050405020304" pitchFamily="18" charset="0"/>
+                <a:cs typeface="Times New Roman" panose="02020603050405020304" pitchFamily="18" charset="0"/>
+              </a:rPr>
+              <a:t>26 </a:t>
+            </a:r>
+            <a:r>
+              <a:rPr lang="nl-NL" dirty="0" smtClean="0">
+                <a:latin typeface="Times New Roman" panose="02020603050405020304" pitchFamily="18" charset="0"/>
+                <a:cs typeface="Times New Roman" panose="02020603050405020304" pitchFamily="18" charset="0"/>
+              </a:rPr>
+              <a:t>al </a:t>
+            </a:r>
+            <a:r>
+              <a:rPr lang="nl-NL" dirty="0" smtClean="0">
+                <a:latin typeface="Times New Roman" panose="02020603050405020304" pitchFamily="18" charset="0"/>
+                <a:cs typeface="Times New Roman" panose="02020603050405020304" pitchFamily="18" charset="0"/>
+              </a:rPr>
+              <a:t>16 </a:t>
+            </a:r>
+            <a:r>
+              <a:rPr lang="nl-NL" dirty="0" smtClean="0">
+                <a:latin typeface="Times New Roman" panose="02020603050405020304" pitchFamily="18" charset="0"/>
+                <a:cs typeface="Times New Roman" panose="02020603050405020304" pitchFamily="18" charset="0"/>
+              </a:rPr>
+              <a:t>operaties nodig. Dus een uitkomstruimte </a:t>
             </a:r>
             <a:r>
               <a:rPr lang="nl-NL" dirty="0">
@@ -10946,6 +10965,228 @@
       <p:bldP spid="3" grpId="0" build="p"/>
     </p:bldLst>
   </p:timing>
+</p:sld>
+</file>
+
+<file path=ppt/slides/slide9.xml><?xml version="1.0" encoding="utf-8"?>
+<p:sld xmlns:a="http://schemas.openxmlformats.org/drawingml/2006/main" xmlns:r="http://schemas.openxmlformats.org/officeDocument/2006/relationships" xmlns:p="http://schemas.openxmlformats.org/presentationml/2006/main">
+  <p:cSld>
+    <p:spTree>
+      <p:nvGrpSpPr>
+        <p:cNvPr id="1" name=""/>
+        <p:cNvGrpSpPr/>
+        <p:nvPr/>
+      </p:nvGrpSpPr>
+      <p:grpSpPr>
+        <a:xfrm>
+          <a:off x="0" y="0"/>
+          <a:ext cx="0" cy="0"/>
+          <a:chOff x="0" y="0"/>
+          <a:chExt cx="0" cy="0"/>
+        </a:xfrm>
+      </p:grpSpPr>
+      <p:sp>
+        <p:nvSpPr>
+          <p:cNvPr id="2" name="Titel 1"/>
+          <p:cNvSpPr>
+            <a:spLocks noGrp="1"/>
+          </p:cNvSpPr>
+          <p:nvPr>
+            <p:ph type="title"/>
+          </p:nvPr>
+        </p:nvSpPr>
+        <p:spPr/>
+        <p:txBody>
+          <a:bodyPr/>
+          <a:lstStyle/>
+          <a:p>
+            <a:r>
+              <a:rPr lang="nl-NL" dirty="0" smtClean="0"/>
+              <a:t>Feedback</a:t>
+            </a:r>
+            <a:endParaRPr lang="en-US" dirty="0"/>
+          </a:p>
+        </p:txBody>
+      </p:sp>
+      <p:sp>
+        <p:nvSpPr>
+          <p:cNvPr id="3" name="Tijdelijke aanduiding voor inhoud 2"/>
+          <p:cNvSpPr>
+            <a:spLocks noGrp="1"/>
+          </p:cNvSpPr>
+          <p:nvPr>
+            <p:ph sz="quarter" idx="1"/>
+          </p:nvPr>
+        </p:nvSpPr>
+        <p:spPr/>
+        <p:txBody>
+          <a:bodyPr/>
+          <a:lstStyle/>
+          <a:p>
+            <a:r>
+              <a:rPr lang="nl-NL" sz="1400" dirty="0" smtClean="0"/>
+              <a:t>++</a:t>
+            </a:r>
+          </a:p>
+          <a:p>
+            <a:pPr lvl="1"/>
+            <a:r>
+              <a:rPr lang="nl-NL" sz="1400" dirty="0" smtClean="0"/>
+              <a:t>Goede reactie op feedback</a:t>
+            </a:r>
+          </a:p>
+          <a:p>
+            <a:pPr lvl="1"/>
+            <a:r>
+              <a:rPr lang="nl-NL" sz="1400" dirty="0" smtClean="0"/>
+              <a:t>Natuurlijk / goed verdeeld</a:t>
+            </a:r>
+          </a:p>
+          <a:p>
+            <a:pPr lvl="1"/>
+            <a:r>
+              <a:rPr lang="nl-NL" sz="1400" dirty="0" smtClean="0"/>
+              <a:t>Goed team</a:t>
+            </a:r>
+          </a:p>
+          <a:p>
+            <a:pPr lvl="1"/>
+            <a:r>
+              <a:rPr lang="nl-NL" sz="1400" dirty="0" smtClean="0"/>
+              <a:t>Enthousiast</a:t>
+            </a:r>
+          </a:p>
+          <a:p>
+            <a:pPr lvl="1"/>
+            <a:r>
+              <a:rPr lang="nl-NL" sz="1400" dirty="0" smtClean="0"/>
+              <a:t>Hard gewerkt </a:t>
+            </a:r>
+            <a:endParaRPr lang="nl-NL" sz="1100" dirty="0" smtClean="0"/>
+          </a:p>
+          <a:p>
+            <a:endParaRPr lang="nl-NL" sz="1400" dirty="0"/>
+          </a:p>
+          <a:p>
+            <a:r>
+              <a:rPr lang="nl-NL" sz="1400" dirty="0" smtClean="0"/>
+              <a:t>--</a:t>
+            </a:r>
+          </a:p>
+          <a:p>
+            <a:pPr lvl="1"/>
+            <a:r>
+              <a:rPr lang="nl-NL" sz="1400" dirty="0" smtClean="0"/>
+              <a:t>Irrelevante informatie op slides</a:t>
+            </a:r>
+          </a:p>
+          <a:p>
+            <a:pPr lvl="1"/>
+            <a:r>
+              <a:rPr lang="nl-NL" sz="1400" dirty="0" smtClean="0"/>
+              <a:t>Hard ingaan op verbetering</a:t>
+            </a:r>
+          </a:p>
+          <a:p>
+            <a:pPr lvl="1"/>
+            <a:r>
+              <a:rPr lang="nl-NL" sz="1400" dirty="0" smtClean="0"/>
+              <a:t>Algoritme visualiseren</a:t>
+            </a:r>
+          </a:p>
+          <a:p>
+            <a:pPr lvl="1"/>
+            <a:endParaRPr lang="nl-NL" sz="1400" dirty="0"/>
+          </a:p>
+          <a:p>
+            <a:r>
+              <a:rPr lang="nl-NL" sz="1700" dirty="0" smtClean="0"/>
+              <a:t>Tips</a:t>
+            </a:r>
+          </a:p>
+          <a:p>
+            <a:pPr lvl="1"/>
+            <a:r>
+              <a:rPr lang="nl-NL" sz="1400" dirty="0" err="1" smtClean="0"/>
+              <a:t>Randomness</a:t>
+            </a:r>
+            <a:endParaRPr lang="nl-NL" sz="1400" dirty="0" smtClean="0"/>
+          </a:p>
+          <a:p>
+            <a:pPr lvl="1"/>
+            <a:r>
+              <a:rPr lang="nl-NL" sz="1400" dirty="0" smtClean="0"/>
+              <a:t>Achterwaarts oplossen</a:t>
+            </a:r>
+          </a:p>
+          <a:p>
+            <a:pPr lvl="1"/>
+            <a:endParaRPr lang="nl-NL" sz="1400" dirty="0" smtClean="0"/>
+          </a:p>
+          <a:p>
+            <a:endParaRPr lang="nl-NL" sz="1400" dirty="0" smtClean="0"/>
+          </a:p>
+          <a:p>
+            <a:endParaRPr lang="en-US" sz="1400" dirty="0"/>
+          </a:p>
+        </p:txBody>
+      </p:sp>
+      <p:sp>
+        <p:nvSpPr>
+          <p:cNvPr id="4" name="Tijdelijke aanduiding voor dianummer 3"/>
+          <p:cNvSpPr>
+            <a:spLocks noGrp="1"/>
+          </p:cNvSpPr>
+          <p:nvPr>
+            <p:ph type="sldNum" sz="quarter" idx="15"/>
+          </p:nvPr>
+        </p:nvSpPr>
+        <p:spPr/>
+        <p:txBody>
+          <a:bodyPr/>
+          <a:lstStyle/>
+          <a:p>
+            <a:fld id="{73A9DCC5-0E95-47E0-8FC1-BDADC25ECB98}" type="slidenum">
+              <a:rPr lang="en-US" smtClean="0"/>
+              <a:t>9</a:t>
+            </a:fld>
+            <a:endParaRPr lang="en-US"/>
+          </a:p>
+        </p:txBody>
+      </p:sp>
+      <p:sp>
+        <p:nvSpPr>
+          <p:cNvPr id="5" name="Tijdelijke aanduiding voor voettekst 4"/>
+          <p:cNvSpPr>
+            <a:spLocks noGrp="1"/>
+          </p:cNvSpPr>
+          <p:nvPr>
+            <p:ph type="ftr" sz="quarter" idx="16"/>
+          </p:nvPr>
+        </p:nvSpPr>
+        <p:spPr/>
+        <p:txBody>
+          <a:bodyPr/>
+          <a:lstStyle/>
+          <a:p>
+            <a:r>
+              <a:rPr lang="en-US" smtClean="0"/>
+              <a:t>Artikel 42</a:t>
+            </a:r>
+            <a:endParaRPr lang="en-US"/>
+          </a:p>
+        </p:txBody>
+      </p:sp>
+    </p:spTree>
+    <p:extLst>
+      <p:ext uri="{BB962C8B-B14F-4D97-AF65-F5344CB8AC3E}">
+        <p14:creationId xmlns:p14="http://schemas.microsoft.com/office/powerpoint/2010/main" val="651287161"/>
+      </p:ext>
+    </p:extLst>
+  </p:cSld>
+  <p:clrMapOvr>
+    <a:masterClrMapping/>
+  </p:clrMapOvr>
 </p:sld>
 </file>
 

</xml_diff>